<commit_message>
After last round of edits.
</commit_message>
<xml_diff>
--- a/Images/Chapter4/UKFBlockDiagram/UKFBlockDiagram.pptx
+++ b/Images/Chapter4/UKFBlockDiagram/UKFBlockDiagram.pptx
@@ -304,7 +304,7 @@
           <a:p>
             <a:fld id="{3C272F55-3C83-4506-9898-EE46A81079BC}" type="datetimeFigureOut">
               <a:rPr lang="en-US" smtClean="0"/>
-              <a:t>12/1/2015</a:t>
+              <a:t>12/2/2015</a:t>
             </a:fld>
             <a:endParaRPr lang="en-US"/>
           </a:p>
@@ -474,7 +474,7 @@
           <a:p>
             <a:fld id="{3C272F55-3C83-4506-9898-EE46A81079BC}" type="datetimeFigureOut">
               <a:rPr lang="en-US" smtClean="0"/>
-              <a:t>12/1/2015</a:t>
+              <a:t>12/2/2015</a:t>
             </a:fld>
             <a:endParaRPr lang="en-US"/>
           </a:p>
@@ -654,7 +654,7 @@
           <a:p>
             <a:fld id="{3C272F55-3C83-4506-9898-EE46A81079BC}" type="datetimeFigureOut">
               <a:rPr lang="en-US" smtClean="0"/>
-              <a:t>12/1/2015</a:t>
+              <a:t>12/2/2015</a:t>
             </a:fld>
             <a:endParaRPr lang="en-US"/>
           </a:p>
@@ -824,7 +824,7 @@
           <a:p>
             <a:fld id="{3C272F55-3C83-4506-9898-EE46A81079BC}" type="datetimeFigureOut">
               <a:rPr lang="en-US" smtClean="0"/>
-              <a:t>12/1/2015</a:t>
+              <a:t>12/2/2015</a:t>
             </a:fld>
             <a:endParaRPr lang="en-US"/>
           </a:p>
@@ -1070,7 +1070,7 @@
           <a:p>
             <a:fld id="{3C272F55-3C83-4506-9898-EE46A81079BC}" type="datetimeFigureOut">
               <a:rPr lang="en-US" smtClean="0"/>
-              <a:t>12/1/2015</a:t>
+              <a:t>12/2/2015</a:t>
             </a:fld>
             <a:endParaRPr lang="en-US"/>
           </a:p>
@@ -1358,7 +1358,7 @@
           <a:p>
             <a:fld id="{3C272F55-3C83-4506-9898-EE46A81079BC}" type="datetimeFigureOut">
               <a:rPr lang="en-US" smtClean="0"/>
-              <a:t>12/1/2015</a:t>
+              <a:t>12/2/2015</a:t>
             </a:fld>
             <a:endParaRPr lang="en-US"/>
           </a:p>
@@ -1780,7 +1780,7 @@
           <a:p>
             <a:fld id="{3C272F55-3C83-4506-9898-EE46A81079BC}" type="datetimeFigureOut">
               <a:rPr lang="en-US" smtClean="0"/>
-              <a:t>12/1/2015</a:t>
+              <a:t>12/2/2015</a:t>
             </a:fld>
             <a:endParaRPr lang="en-US"/>
           </a:p>
@@ -1898,7 +1898,7 @@
           <a:p>
             <a:fld id="{3C272F55-3C83-4506-9898-EE46A81079BC}" type="datetimeFigureOut">
               <a:rPr lang="en-US" smtClean="0"/>
-              <a:t>12/1/2015</a:t>
+              <a:t>12/2/2015</a:t>
             </a:fld>
             <a:endParaRPr lang="en-US"/>
           </a:p>
@@ -1993,7 +1993,7 @@
           <a:p>
             <a:fld id="{3C272F55-3C83-4506-9898-EE46A81079BC}" type="datetimeFigureOut">
               <a:rPr lang="en-US" smtClean="0"/>
-              <a:t>12/1/2015</a:t>
+              <a:t>12/2/2015</a:t>
             </a:fld>
             <a:endParaRPr lang="en-US"/>
           </a:p>
@@ -2270,7 +2270,7 @@
           <a:p>
             <a:fld id="{3C272F55-3C83-4506-9898-EE46A81079BC}" type="datetimeFigureOut">
               <a:rPr lang="en-US" smtClean="0"/>
-              <a:t>12/1/2015</a:t>
+              <a:t>12/2/2015</a:t>
             </a:fld>
             <a:endParaRPr lang="en-US"/>
           </a:p>
@@ -2523,7 +2523,7 @@
           <a:p>
             <a:fld id="{3C272F55-3C83-4506-9898-EE46A81079BC}" type="datetimeFigureOut">
               <a:rPr lang="en-US" smtClean="0"/>
-              <a:t>12/1/2015</a:t>
+              <a:t>12/2/2015</a:t>
             </a:fld>
             <a:endParaRPr lang="en-US"/>
           </a:p>
@@ -2736,7 +2736,7 @@
           <a:p>
             <a:fld id="{3C272F55-3C83-4506-9898-EE46A81079BC}" type="datetimeFigureOut">
               <a:rPr lang="en-US" smtClean="0"/>
-              <a:t>12/1/2015</a:t>
+              <a:t>12/2/2015</a:t>
             </a:fld>
             <a:endParaRPr lang="en-US"/>
           </a:p>
@@ -3329,17 +3329,7 @@
                 <a:latin typeface="NimbusRomNo9L" panose="01010103010101010101" pitchFamily="2" charset="0"/>
                 <a:cs typeface="Times New Roman" pitchFamily="18" charset="0"/>
               </a:rPr>
-              <a:t>Steering </a:t>
-            </a:r>
-            <a:r>
-              <a:rPr lang="en-US" b="1" dirty="0" smtClean="0">
-                <a:solidFill>
-                  <a:schemeClr val="tx1"/>
-                </a:solidFill>
-                <a:latin typeface="NimbusRomNo9L" panose="01010103010101010101" pitchFamily="2" charset="0"/>
-                <a:cs typeface="Times New Roman" pitchFamily="18" charset="0"/>
-              </a:rPr>
-              <a:t>Controller</a:t>
+              <a:t>Steering Controller</a:t>
             </a:r>
             <a:endParaRPr lang="en-US" b="1" dirty="0">
               <a:solidFill>
@@ -3452,8 +3442,8 @@
           </a:fontRef>
         </p:style>
       </p:cxnSp>
-      <mc:AlternateContent xmlns:mc="http://schemas.openxmlformats.org/markup-compatibility/2006">
-        <mc:Choice xmlns:a14="http://schemas.microsoft.com/office/drawing/2010/main" Requires="a14">
+      <mc:AlternateContent xmlns:mc="http://schemas.openxmlformats.org/markup-compatibility/2006" xmlns:a14="http://schemas.microsoft.com/office/drawing/2010/main">
+        <mc:Choice Requires="a14">
           <p:sp>
             <p:nvSpPr>
               <p:cNvPr id="163" name="Rectangle 162"/>
@@ -3524,7 +3514,7 @@
             </p:txBody>
           </p:sp>
         </mc:Choice>
-        <mc:Fallback>
+        <mc:Fallback xmlns="">
           <p:sp>
             <p:nvSpPr>
               <p:cNvPr id="163" name="Rectangle 162"/>
@@ -3611,8 +3601,8 @@
           </a:fontRef>
         </p:style>
       </p:cxnSp>
-      <mc:AlternateContent xmlns:mc="http://schemas.openxmlformats.org/markup-compatibility/2006">
-        <mc:Choice xmlns:a14="http://schemas.microsoft.com/office/drawing/2010/main" Requires="a14">
+      <mc:AlternateContent xmlns:mc="http://schemas.openxmlformats.org/markup-compatibility/2006" xmlns:a14="http://schemas.microsoft.com/office/drawing/2010/main">
+        <mc:Choice Requires="a14">
           <p:sp>
             <p:nvSpPr>
               <p:cNvPr id="165" name="Rectangle 164"/>
@@ -3621,7 +3611,7 @@
             </p:nvSpPr>
             <p:spPr>
               <a:xfrm>
-                <a:off x="1300012" y="147229"/>
+                <a:off x="1301383" y="167017"/>
                 <a:ext cx="452588" cy="274778"/>
               </a:xfrm>
               <a:prstGeom prst="rect">
@@ -3738,7 +3728,7 @@
             </p:txBody>
           </p:sp>
         </mc:Choice>
-        <mc:Fallback>
+        <mc:Fallback xmlns="">
           <p:sp>
             <p:nvSpPr>
               <p:cNvPr id="165" name="Rectangle 164"/>
@@ -3749,7 +3739,7 @@
             </p:nvSpPr>
             <p:spPr>
               <a:xfrm>
-                <a:off x="1300012" y="147229"/>
+                <a:off x="1301383" y="167017"/>
                 <a:ext cx="452588" cy="274778"/>
               </a:xfrm>
               <a:prstGeom prst="rect">
@@ -3758,7 +3748,7 @@
               <a:blipFill rotWithShape="0">
                 <a:blip r:embed="rId3"/>
                 <a:stretch>
-                  <a:fillRect l="-10667"/>
+                  <a:fillRect l="-9333"/>
                 </a:stretch>
               </a:blipFill>
               <a:ln w="28575">
@@ -3825,8 +3815,8 @@
           </a:fontRef>
         </p:style>
       </p:cxnSp>
-      <mc:AlternateContent xmlns:mc="http://schemas.openxmlformats.org/markup-compatibility/2006">
-        <mc:Choice xmlns:a14="http://schemas.microsoft.com/office/drawing/2010/main" Requires="a14">
+      <mc:AlternateContent xmlns:mc="http://schemas.openxmlformats.org/markup-compatibility/2006" xmlns:a14="http://schemas.microsoft.com/office/drawing/2010/main">
+        <mc:Choice Requires="a14">
           <p:sp>
             <p:nvSpPr>
               <p:cNvPr id="167" name="Rectangle 166"/>
@@ -3922,7 +3912,7 @@
             </p:txBody>
           </p:sp>
         </mc:Choice>
-        <mc:Fallback>
+        <mc:Fallback xmlns="">
           <p:sp>
             <p:nvSpPr>
               <p:cNvPr id="167" name="Rectangle 166"/>
@@ -4265,8 +4255,8 @@
           </a:p>
         </p:txBody>
       </p:sp>
-      <mc:AlternateContent xmlns:mc="http://schemas.openxmlformats.org/markup-compatibility/2006">
-        <mc:Choice xmlns:a14="http://schemas.microsoft.com/office/drawing/2010/main" Requires="a14">
+      <mc:AlternateContent xmlns:mc="http://schemas.openxmlformats.org/markup-compatibility/2006" xmlns:a14="http://schemas.microsoft.com/office/drawing/2010/main">
+        <mc:Choice Requires="a14">
           <p:sp>
             <p:nvSpPr>
               <p:cNvPr id="173" name="Rectangle 172"/>
@@ -4458,7 +4448,7 @@
             </p:txBody>
           </p:sp>
         </mc:Choice>
-        <mc:Fallback>
+        <mc:Fallback xmlns="">
           <p:sp>
             <p:nvSpPr>
               <p:cNvPr id="173" name="Rectangle 172"/>
@@ -4802,16 +4792,6 @@
               </a:rPr>
               <a:t>motor </a:t>
             </a:r>
-            <a:r>
-              <a:rPr lang="en-US" dirty="0" smtClean="0">
-                <a:solidFill>
-                  <a:schemeClr val="tx1"/>
-                </a:solidFill>
-                <a:latin typeface="NimbusRomNo9L" panose="01010103010101010101" pitchFamily="2" charset="0"/>
-                <a:cs typeface="Times New Roman" pitchFamily="18" charset="0"/>
-              </a:rPr>
-              <a:t/>
-            </a:r>
             <a:br>
               <a:rPr lang="en-US" dirty="0" smtClean="0">
                 <a:solidFill>
@@ -4908,8 +4888,8 @@
           </a:p>
         </p:txBody>
       </p:sp>
-      <mc:AlternateContent xmlns:mc="http://schemas.openxmlformats.org/markup-compatibility/2006">
-        <mc:Choice xmlns:a14="http://schemas.microsoft.com/office/drawing/2010/main" Requires="a14">
+      <mc:AlternateContent xmlns:mc="http://schemas.openxmlformats.org/markup-compatibility/2006" xmlns:a14="http://schemas.microsoft.com/office/drawing/2010/main">
+        <mc:Choice Requires="a14">
           <p:sp>
             <p:nvSpPr>
               <p:cNvPr id="181" name="Rectangle 180"/>
@@ -5094,7 +5074,7 @@
             </p:txBody>
           </p:sp>
         </mc:Choice>
-        <mc:Fallback>
+        <mc:Fallback xmlns="">
           <p:sp>
             <p:nvSpPr>
               <p:cNvPr id="181" name="Rectangle 180"/>
@@ -5251,8 +5231,8 @@
           </a:fontRef>
         </p:style>
       </p:cxnSp>
-      <mc:AlternateContent xmlns:mc="http://schemas.openxmlformats.org/markup-compatibility/2006">
-        <mc:Choice xmlns:a14="http://schemas.microsoft.com/office/drawing/2010/main" Requires="a14">
+      <mc:AlternateContent xmlns:mc="http://schemas.openxmlformats.org/markup-compatibility/2006" xmlns:a14="http://schemas.microsoft.com/office/drawing/2010/main">
+        <mc:Choice Requires="a14">
           <p:sp>
             <p:nvSpPr>
               <p:cNvPr id="184" name="Rectangle 183"/>
@@ -5346,7 +5326,7 @@
             </p:txBody>
           </p:sp>
         </mc:Choice>
-        <mc:Fallback>
+        <mc:Fallback xmlns="">
           <p:sp>
             <p:nvSpPr>
               <p:cNvPr id="184" name="Rectangle 183"/>
@@ -5452,8 +5432,8 @@
           </a:p>
         </p:txBody>
       </p:sp>
-      <mc:AlternateContent xmlns:mc="http://schemas.openxmlformats.org/markup-compatibility/2006">
-        <mc:Choice xmlns:a14="http://schemas.microsoft.com/office/drawing/2010/main" Requires="a14">
+      <mc:AlternateContent xmlns:mc="http://schemas.openxmlformats.org/markup-compatibility/2006" xmlns:a14="http://schemas.microsoft.com/office/drawing/2010/main">
+        <mc:Choice Requires="a14">
           <p:sp>
             <p:nvSpPr>
               <p:cNvPr id="186" name="Rectangle 185"/>
@@ -5475,6 +5455,7 @@
               </a:bodyPr>
               <a:lstStyle/>
               <a:p>
+                <a:pPr/>
                 <a14:m>
                   <m:oMathPara xmlns:m="http://schemas.openxmlformats.org/officeDocument/2006/math">
                     <m:oMathParaPr>
@@ -5497,7 +5478,7 @@
             </p:txBody>
           </p:sp>
         </mc:Choice>
-        <mc:Fallback>
+        <mc:Fallback xmlns="">
           <p:sp>
             <p:nvSpPr>
               <p:cNvPr id="186" name="Rectangle 185"/>
@@ -5668,6 +5649,7 @@
               </a:bodyPr>
               <a:lstStyle/>
               <a:p>
+                <a:pPr/>
                 <a14:m>
                   <m:oMathPara xmlns:m="http://schemas.openxmlformats.org/officeDocument/2006/math">
                     <m:oMathParaPr>
@@ -5676,7 +5658,7 @@
                     <m:oMath xmlns:m="http://schemas.openxmlformats.org/officeDocument/2006/math">
                       <m:acc>
                         <m:accPr>
-                          <m:chr m:val="̂"/>
+                          <m:chr m:val="̃"/>
                           <m:ctrlPr>
                             <a:rPr lang="en-US" b="0" i="1" smtClean="0">
                               <a:latin typeface="Cambria Math" panose="02040503050406030204" pitchFamily="18" charset="0"/>
@@ -5758,6 +5740,51 @@
             <a:ext cx="0" cy="421256"/>
           </a:xfrm>
           <a:prstGeom prst="straightConnector1">
+            <a:avLst/>
+          </a:prstGeom>
+          <a:solidFill>
+            <a:schemeClr val="bg1"/>
+          </a:solidFill>
+          <a:ln w="19050">
+            <a:solidFill>
+              <a:schemeClr val="tx1"/>
+            </a:solidFill>
+            <a:headEnd type="none" w="med" len="med"/>
+            <a:tailEnd type="stealth" w="lg" len="lg"/>
+          </a:ln>
+        </p:spPr>
+        <p:style>
+          <a:lnRef idx="2">
+            <a:schemeClr val="accent1">
+              <a:shade val="50000"/>
+            </a:schemeClr>
+          </a:lnRef>
+          <a:fillRef idx="1">
+            <a:schemeClr val="accent1"/>
+          </a:fillRef>
+          <a:effectRef idx="0">
+            <a:schemeClr val="accent1"/>
+          </a:effectRef>
+          <a:fontRef idx="minor">
+            <a:schemeClr val="lt1"/>
+          </a:fontRef>
+        </p:style>
+      </p:cxnSp>
+      <p:cxnSp>
+        <p:nvCxnSpPr>
+          <p:cNvPr id="36" name="Elbow Connector 35"/>
+          <p:cNvCxnSpPr>
+            <a:stCxn id="165" idx="2"/>
+            <a:endCxn id="188" idx="3"/>
+          </p:cNvCxnSpPr>
+          <p:nvPr/>
+        </p:nvCxnSpPr>
+        <p:spPr>
+          <a:xfrm rot="5400000">
+            <a:off x="849933" y="734863"/>
+            <a:ext cx="970812" cy="384677"/>
+          </a:xfrm>
+          <a:prstGeom prst="bentConnector2">
             <a:avLst/>
           </a:prstGeom>
           <a:solidFill>

</xml_diff>